<commit_message>
ee VIS 02 überarbeitet
</commit_message>
<xml_diff>
--- a/emotional erwachsen/Vision (VIS)/ger_VIS_02_Leben_mit_ohne_Vision.pptx
+++ b/emotional erwachsen/Vision (VIS)/ger_VIS_02_Leben_mit_ohne_Vision.pptx
@@ -196,7 +196,7 @@
           <a:p>
             <a:fld id="{6E077CBB-2DF5-4D45-BDDD-22DB2684D07E}" type="datetimeFigureOut">
               <a:rPr lang="de-DE" smtClean="0"/>
-              <a:t>29.05.15</a:t>
+              <a:t>05.06.15</a:t>
             </a:fld>
             <a:endParaRPr lang="de-DE"/>
           </a:p>
@@ -361,7 +361,7 @@
           <a:p>
             <a:fld id="{28CA1EEA-8747-224F-96F6-9D3A7D84E6AC}" type="datetimeFigureOut">
               <a:rPr lang="de-DE" smtClean="0"/>
-              <a:t>29.05.15</a:t>
+              <a:t>05.06.15</a:t>
             </a:fld>
             <a:endParaRPr lang="de-DE"/>
           </a:p>
@@ -1181,6 +1181,36 @@
           </a:p>
         </p:txBody>
       </p:sp>
+      <p:pic>
+        <p:nvPicPr>
+          <p:cNvPr id="2" name="Bild 1" descr="ee_apprentice.pdf"/>
+          <p:cNvPicPr>
+            <a:picLocks noChangeAspect="1"/>
+          </p:cNvPicPr>
+          <p:nvPr userDrawn="1"/>
+        </p:nvPicPr>
+        <p:blipFill>
+          <a:blip r:embed="rId2">
+            <a:extLst>
+              <a:ext uri="{28A0092B-C50C-407E-A947-70E740481C1C}">
+                <a14:useLocalDpi xmlns:a14="http://schemas.microsoft.com/office/drawing/2010/main" val="0"/>
+              </a:ext>
+            </a:extLst>
+          </a:blip>
+          <a:stretch>
+            <a:fillRect/>
+          </a:stretch>
+        </p:blipFill>
+        <p:spPr>
+          <a:xfrm>
+            <a:off x="5639832" y="3342538"/>
+            <a:ext cx="1028700" cy="1041400"/>
+          </a:xfrm>
+          <a:prstGeom prst="rect">
+            <a:avLst/>
+          </a:prstGeom>
+        </p:spPr>
+      </p:pic>
     </p:spTree>
     <p:extLst>
       <p:ext uri="{BB962C8B-B14F-4D97-AF65-F5344CB8AC3E}">
@@ -1255,7 +1285,7 @@
           <a:p>
             <a:fld id="{FF5B2BAF-DF38-0A48-A798-0C06E514FD52}" type="datetimeFigureOut">
               <a:rPr lang="de-DE" smtClean="0"/>
-              <a:t>29.05.15</a:t>
+              <a:t>05.06.15</a:t>
             </a:fld>
             <a:endParaRPr lang="de-DE" dirty="0"/>
           </a:p>
@@ -1338,53 +1368,6 @@
           <a:chExt cx="0" cy="0"/>
         </a:xfrm>
       </p:grpSpPr>
-      <p:sp>
-        <p:nvSpPr>
-          <p:cNvPr id="12" name="Rechteck 11"/>
-          <p:cNvSpPr/>
-          <p:nvPr userDrawn="1"/>
-        </p:nvSpPr>
-        <p:spPr>
-          <a:xfrm>
-            <a:off x="0" y="0"/>
-            <a:ext cx="7562850" cy="5330825"/>
-          </a:xfrm>
-          <a:prstGeom prst="rect">
-            <a:avLst/>
-          </a:prstGeom>
-          <a:noFill/>
-          <a:ln>
-            <a:solidFill>
-              <a:schemeClr val="bg1">
-                <a:lumMod val="75000"/>
-              </a:schemeClr>
-            </a:solidFill>
-          </a:ln>
-          <a:effectLst/>
-        </p:spPr>
-        <p:style>
-          <a:lnRef idx="1">
-            <a:schemeClr val="accent1"/>
-          </a:lnRef>
-          <a:fillRef idx="3">
-            <a:schemeClr val="accent1"/>
-          </a:fillRef>
-          <a:effectRef idx="2">
-            <a:schemeClr val="accent1"/>
-          </a:effectRef>
-          <a:fontRef idx="minor">
-            <a:schemeClr val="lt1"/>
-          </a:fontRef>
-        </p:style>
-        <p:txBody>
-          <a:bodyPr rtlCol="0" anchor="ctr"/>
-          <a:lstStyle/>
-          <a:p>
-            <a:pPr algn="ctr"/>
-            <a:endParaRPr lang="de-DE"/>
-          </a:p>
-        </p:txBody>
-      </p:sp>
       <p:pic>
         <p:nvPicPr>
           <p:cNvPr id="11" name="Bild 10" descr="Signet.jpg"/>
@@ -1545,7 +1528,7 @@
           <a:p>
             <a:fld id="{FF5B2BAF-DF38-0A48-A798-0C06E514FD52}" type="datetimeFigureOut">
               <a:rPr lang="de-DE" smtClean="0"/>
-              <a:t>29.05.15</a:t>
+              <a:t>05.06.15</a:t>
             </a:fld>
             <a:endParaRPr lang="de-DE" dirty="0"/>
           </a:p>
@@ -1808,6 +1791,51 @@
               <a:latin typeface="Avenir Heavy"/>
               <a:cs typeface="Avenir Heavy"/>
             </a:endParaRPr>
+          </a:p>
+        </p:txBody>
+      </p:sp>
+      <p:sp>
+        <p:nvSpPr>
+          <p:cNvPr id="12" name="Rechteck 11"/>
+          <p:cNvSpPr/>
+          <p:nvPr userDrawn="1"/>
+        </p:nvSpPr>
+        <p:spPr>
+          <a:xfrm>
+            <a:off x="0" y="0"/>
+            <a:ext cx="7562850" cy="5330825"/>
+          </a:xfrm>
+          <a:prstGeom prst="rect">
+            <a:avLst/>
+          </a:prstGeom>
+          <a:noFill/>
+          <a:ln>
+            <a:solidFill>
+              <a:srgbClr val="000000"/>
+            </a:solidFill>
+          </a:ln>
+          <a:effectLst/>
+        </p:spPr>
+        <p:style>
+          <a:lnRef idx="1">
+            <a:schemeClr val="accent1"/>
+          </a:lnRef>
+          <a:fillRef idx="3">
+            <a:schemeClr val="accent1"/>
+          </a:fillRef>
+          <a:effectRef idx="2">
+            <a:schemeClr val="accent1"/>
+          </a:effectRef>
+          <a:fontRef idx="minor">
+            <a:schemeClr val="lt1"/>
+          </a:fontRef>
+        </p:style>
+        <p:txBody>
+          <a:bodyPr rtlCol="0" anchor="ctr"/>
+          <a:lstStyle/>
+          <a:p>
+            <a:pPr algn="ctr"/>
+            <a:endParaRPr lang="de-DE"/>
           </a:p>
         </p:txBody>
       </p:sp>
@@ -2477,7 +2505,7 @@
         <p:spPr/>
         <p:txBody>
           <a:bodyPr>
-            <a:normAutofit/>
+            <a:normAutofit fontScale="92500"/>
           </a:bodyPr>
           <a:lstStyle/>
           <a:p>
@@ -2569,7 +2597,37 @@
             </a:pPr>
             <a:r>
               <a:rPr lang="de-DE" sz="1050" dirty="0" smtClean="0"/>
-              <a:t>Lese Dir Deinen Visionstext nach einem Tag /nach 2 Tagen noch einmal durch und bewerte selbst, wie sehr er Dich innerlich berührt. Bewerte ihn selbst mit 1- 5 Sternen. </a:t>
+              <a:t>Lese Dir Deinen Visionstext nach einem Tag /nach 2 Tagen </a:t>
+            </a:r>
+            <a:r>
+              <a:rPr lang="de-DE" sz="1050" dirty="0" smtClean="0"/>
+              <a:t>noch</a:t>
+            </a:r>
+            <a:br>
+              <a:rPr lang="de-DE" sz="1050" dirty="0" smtClean="0"/>
+            </a:br>
+            <a:r>
+              <a:rPr lang="de-DE" sz="1050" dirty="0" smtClean="0"/>
+              <a:t> </a:t>
+            </a:r>
+            <a:r>
+              <a:rPr lang="de-DE" sz="1050" dirty="0" smtClean="0"/>
+              <a:t>einmal durch und bewerte selbst, wie sehr er Dich innerlich berührt</a:t>
+            </a:r>
+            <a:r>
+              <a:rPr lang="de-DE" sz="1050" dirty="0" smtClean="0"/>
+              <a:t>.</a:t>
+            </a:r>
+            <a:br>
+              <a:rPr lang="de-DE" sz="1050" dirty="0" smtClean="0"/>
+            </a:br>
+            <a:r>
+              <a:rPr lang="de-DE" sz="1050" dirty="0" smtClean="0"/>
+              <a:t> </a:t>
+            </a:r>
+            <a:r>
+              <a:rPr lang="de-DE" sz="1050" dirty="0" smtClean="0"/>
+              <a:t>Bewerte ihn selbst mit 1- 5 Sternen. </a:t>
             </a:r>
           </a:p>
           <a:p>
@@ -2583,7 +2641,22 @@
             </a:pPr>
             <a:r>
               <a:rPr lang="de-DE" sz="1050" dirty="0" smtClean="0"/>
-              <a:t>Gibt es einen Aspekt darin, der Dich selbst so berührt, dass Du ihm einen weiteren Visionstext widmen möchtest?</a:t>
+              <a:t>Gibt es einen Aspekt darin, der Dich selbst so berührt, dass Du </a:t>
+            </a:r>
+            <a:r>
+              <a:rPr lang="de-DE" sz="1050" dirty="0" smtClean="0"/>
+              <a:t>ihm</a:t>
+            </a:r>
+            <a:br>
+              <a:rPr lang="de-DE" sz="1050" dirty="0" smtClean="0"/>
+            </a:br>
+            <a:r>
+              <a:rPr lang="de-DE" sz="1050" dirty="0" smtClean="0"/>
+              <a:t>einen </a:t>
+            </a:r>
+            <a:r>
+              <a:rPr lang="de-DE" sz="1050" dirty="0" smtClean="0"/>
+              <a:t>weiteren Visionstext widmen möchtest?</a:t>
             </a:r>
           </a:p>
           <a:p>

</xml_diff>